<commit_message>
03 Convolutions (hopefully) done!
</commit_message>
<xml_diff>
--- a/slides/nlp p03 feed forward networks/nlp p03.4 convolutional neural network.pptx
+++ b/slides/nlp p03 feed forward networks/nlp p03.4 convolutional neural network.pptx
@@ -238,7 +238,7 @@
             <a:fld id="{C9C2CC2B-07F5-486B-80F8-D7AC8876AF81}" type="datetimeFigureOut">
               <a:rPr lang="sr-Latn-CS" smtClean="0"/>
               <a:pPr/>
-              <a:t>7.11.22.</a:t>
+              <a:t>9.11.22.</a:t>
             </a:fld>
             <a:endParaRPr lang="hr-HR" dirty="0"/>
           </a:p>
@@ -1369,7 +1369,7 @@
             <a:fld id="{DA765C48-E28F-491B-A6FC-AD0BFE4ABDB2}" type="datetimeFigureOut">
               <a:rPr lang="sr-Latn-CS" smtClean="0"/>
               <a:pPr/>
-              <a:t>7.11.22.</a:t>
+              <a:t>9.11.22.</a:t>
             </a:fld>
             <a:endParaRPr lang="hr-HR" dirty="0"/>
           </a:p>
@@ -1540,7 +1540,7 @@
             <a:fld id="{DA765C48-E28F-491B-A6FC-AD0BFE4ABDB2}" type="datetimeFigureOut">
               <a:rPr lang="sr-Latn-CS" smtClean="0"/>
               <a:pPr/>
-              <a:t>7.11.22.</a:t>
+              <a:t>9.11.22.</a:t>
             </a:fld>
             <a:endParaRPr lang="hr-HR" dirty="0"/>
           </a:p>
@@ -1717,7 +1717,7 @@
             <a:fld id="{DA765C48-E28F-491B-A6FC-AD0BFE4ABDB2}" type="datetimeFigureOut">
               <a:rPr lang="sr-Latn-CS" smtClean="0"/>
               <a:pPr/>
-              <a:t>7.11.22.</a:t>
+              <a:t>9.11.22.</a:t>
             </a:fld>
             <a:endParaRPr lang="hr-HR" dirty="0"/>
           </a:p>
@@ -1888,7 +1888,7 @@
             <a:fld id="{DA765C48-E28F-491B-A6FC-AD0BFE4ABDB2}" type="datetimeFigureOut">
               <a:rPr lang="sr-Latn-CS" smtClean="0"/>
               <a:pPr/>
-              <a:t>7.11.22.</a:t>
+              <a:t>9.11.22.</a:t>
             </a:fld>
             <a:endParaRPr lang="hr-HR" dirty="0"/>
           </a:p>
@@ -2129,7 +2129,7 @@
             <a:fld id="{DA765C48-E28F-491B-A6FC-AD0BFE4ABDB2}" type="datetimeFigureOut">
               <a:rPr lang="sr-Latn-CS" smtClean="0"/>
               <a:pPr/>
-              <a:t>7.11.22.</a:t>
+              <a:t>9.11.22.</a:t>
             </a:fld>
             <a:endParaRPr lang="hr-HR" dirty="0"/>
           </a:p>
@@ -2418,7 +2418,7 @@
             <a:fld id="{DA765C48-E28F-491B-A6FC-AD0BFE4ABDB2}" type="datetimeFigureOut">
               <a:rPr lang="sr-Latn-CS" smtClean="0"/>
               <a:pPr/>
-              <a:t>7.11.22.</a:t>
+              <a:t>9.11.22.</a:t>
             </a:fld>
             <a:endParaRPr lang="hr-HR" dirty="0"/>
           </a:p>
@@ -2837,7 +2837,7 @@
             <a:fld id="{DA765C48-E28F-491B-A6FC-AD0BFE4ABDB2}" type="datetimeFigureOut">
               <a:rPr lang="sr-Latn-CS" smtClean="0"/>
               <a:pPr/>
-              <a:t>7.11.22.</a:t>
+              <a:t>9.11.22.</a:t>
             </a:fld>
             <a:endParaRPr lang="hr-HR" dirty="0"/>
           </a:p>
@@ -2956,7 +2956,7 @@
             <a:fld id="{DA765C48-E28F-491B-A6FC-AD0BFE4ABDB2}" type="datetimeFigureOut">
               <a:rPr lang="sr-Latn-CS" smtClean="0"/>
               <a:pPr/>
-              <a:t>7.11.22.</a:t>
+              <a:t>9.11.22.</a:t>
             </a:fld>
             <a:endParaRPr lang="hr-HR" dirty="0"/>
           </a:p>
@@ -3048,7 +3048,7 @@
             <a:fld id="{DA765C48-E28F-491B-A6FC-AD0BFE4ABDB2}" type="datetimeFigureOut">
               <a:rPr lang="sr-Latn-CS" smtClean="0"/>
               <a:pPr/>
-              <a:t>7.11.22.</a:t>
+              <a:t>9.11.22.</a:t>
             </a:fld>
             <a:endParaRPr lang="hr-HR" dirty="0"/>
           </a:p>
@@ -3322,7 +3322,7 @@
             <a:fld id="{DA765C48-E28F-491B-A6FC-AD0BFE4ABDB2}" type="datetimeFigureOut">
               <a:rPr lang="sr-Latn-CS" smtClean="0"/>
               <a:pPr/>
-              <a:t>7.11.22.</a:t>
+              <a:t>9.11.22.</a:t>
             </a:fld>
             <a:endParaRPr lang="hr-HR" dirty="0"/>
           </a:p>
@@ -3576,7 +3576,7 @@
             <a:fld id="{DA765C48-E28F-491B-A6FC-AD0BFE4ABDB2}" type="datetimeFigureOut">
               <a:rPr lang="sr-Latn-CS" smtClean="0"/>
               <a:pPr/>
-              <a:t>7.11.22.</a:t>
+              <a:t>9.11.22.</a:t>
             </a:fld>
             <a:endParaRPr lang="hr-HR" dirty="0"/>
           </a:p>
@@ -3794,7 +3794,7 @@
             <a:fld id="{DA765C48-E28F-491B-A6FC-AD0BFE4ABDB2}" type="datetimeFigureOut">
               <a:rPr lang="sr-Latn-CS" smtClean="0"/>
               <a:pPr/>
-              <a:t>7.11.22.</a:t>
+              <a:t>9.11.22.</a:t>
             </a:fld>
             <a:endParaRPr lang="hr-HR" dirty="0"/>
           </a:p>
@@ -37613,19 +37613,229 @@
             </a:r>
             <a:r>
               <a:rPr lang="en-US" dirty="0"/>
-              <a:t> module. Example shows how to instantiate and use </a:t>
-            </a:r>
-            <a:r>
-              <a:rPr lang="en-US" dirty="0" err="1"/>
-              <a:t>BatchNorm</a:t>
-            </a:r>
-            <a:r>
-              <a:rPr lang="en-US" dirty="0"/>
-              <a:t> with convolution and Linear layers.</a:t>
+              <a:t> module.</a:t>
             </a:r>
           </a:p>
         </p:txBody>
       </p:sp>
+      <mc:AlternateContent xmlns:mc="http://schemas.openxmlformats.org/markup-compatibility/2006">
+        <mc:Choice xmlns:a14="http://schemas.microsoft.com/office/drawing/2010/main" Requires="a14">
+          <p:sp>
+            <p:nvSpPr>
+              <p:cNvPr id="4" name="TextBox 3">
+                <a:extLst>
+                  <a:ext uri="{FF2B5EF4-FFF2-40B4-BE49-F238E27FC236}">
+                    <a16:creationId xmlns:a16="http://schemas.microsoft.com/office/drawing/2014/main" id="{B2EA1116-2CBB-A024-904D-4BC872E63493}"/>
+                  </a:ext>
+                </a:extLst>
+              </p:cNvPr>
+              <p:cNvSpPr txBox="1"/>
+              <p:nvPr/>
+            </p:nvSpPr>
+            <p:spPr>
+              <a:xfrm>
+                <a:off x="2771800" y="4869160"/>
+                <a:ext cx="2592288" cy="938783"/>
+              </a:xfrm>
+              <a:prstGeom prst="rect">
+                <a:avLst/>
+              </a:prstGeom>
+              <a:noFill/>
+            </p:spPr>
+            <p:txBody>
+              <a:bodyPr wrap="square" rtlCol="0">
+                <a:spAutoFit/>
+              </a:bodyPr>
+              <a:lstStyle/>
+              <a:p>
+                <a14:m>
+                  <m:oMathPara xmlns:m="http://schemas.openxmlformats.org/officeDocument/2006/math">
+                    <m:oMathParaPr>
+                      <m:jc m:val="centerGroup"/>
+                    </m:oMathParaPr>
+                    <m:oMath xmlns:m="http://schemas.openxmlformats.org/officeDocument/2006/math">
+                      <m:f>
+                        <m:fPr>
+                          <m:ctrlPr>
+                            <a:rPr lang="hr-HR" sz="2400" b="0" i="1" smtClean="0">
+                              <a:latin typeface="Cambria Math" panose="02040503050406030204" pitchFamily="18" charset="0"/>
+                              <a:ea typeface="Cambria Math" panose="02040503050406030204" pitchFamily="18" charset="0"/>
+                            </a:rPr>
+                          </m:ctrlPr>
+                        </m:fPr>
+                        <m:num>
+                          <m:r>
+                            <a:rPr lang="hr-HR" sz="2400" b="0" i="1" smtClean="0">
+                              <a:latin typeface="Cambria Math" panose="02040503050406030204" pitchFamily="18" charset="0"/>
+                            </a:rPr>
+                            <m:t>𝑋</m:t>
+                          </m:r>
+                          <m:r>
+                            <a:rPr lang="hr-HR" sz="2400" i="1">
+                              <a:latin typeface="Cambria Math" panose="02040503050406030204" pitchFamily="18" charset="0"/>
+                            </a:rPr>
+                            <m:t>−</m:t>
+                          </m:r>
+                          <m:sSub>
+                            <m:sSubPr>
+                              <m:ctrlPr>
+                                <a:rPr lang="hr-HR" sz="2400" b="0" i="1" smtClean="0">
+                                  <a:latin typeface="Cambria Math" panose="02040503050406030204" pitchFamily="18" charset="0"/>
+                                  <a:ea typeface="Cambria Math" panose="02040503050406030204" pitchFamily="18" charset="0"/>
+                                </a:rPr>
+                              </m:ctrlPr>
+                            </m:sSubPr>
+                            <m:e>
+                              <m:r>
+                                <a:rPr lang="hr-HR" sz="2400" b="0" i="1" smtClean="0">
+                                  <a:latin typeface="Cambria Math" panose="02040503050406030204" pitchFamily="18" charset="0"/>
+                                  <a:ea typeface="Cambria Math" panose="02040503050406030204" pitchFamily="18" charset="0"/>
+                                </a:rPr>
+                                <m:t>𝜇</m:t>
+                              </m:r>
+                            </m:e>
+                            <m:sub>
+                              <m:r>
+                                <a:rPr lang="hr-HR" sz="2400" b="0" i="1" smtClean="0">
+                                  <a:latin typeface="Cambria Math" panose="02040503050406030204" pitchFamily="18" charset="0"/>
+                                  <a:ea typeface="Cambria Math" panose="02040503050406030204" pitchFamily="18" charset="0"/>
+                                </a:rPr>
+                                <m:t>𝑋</m:t>
+                              </m:r>
+                            </m:sub>
+                          </m:sSub>
+                        </m:num>
+                        <m:den>
+                          <m:rad>
+                            <m:radPr>
+                              <m:degHide m:val="on"/>
+                              <m:ctrlPr>
+                                <a:rPr lang="hr-HR" sz="2400" b="0" i="1" smtClean="0">
+                                  <a:latin typeface="Cambria Math" panose="02040503050406030204" pitchFamily="18" charset="0"/>
+                                  <a:ea typeface="Cambria Math" panose="02040503050406030204" pitchFamily="18" charset="0"/>
+                                </a:rPr>
+                              </m:ctrlPr>
+                            </m:radPr>
+                            <m:deg/>
+                            <m:e>
+                              <m:r>
+                                <a:rPr lang="hr-HR" sz="2400" b="0" i="1" smtClean="0">
+                                  <a:latin typeface="Cambria Math" panose="02040503050406030204" pitchFamily="18" charset="0"/>
+                                  <a:ea typeface="Cambria Math" panose="02040503050406030204" pitchFamily="18" charset="0"/>
+                                </a:rPr>
+                                <m:t>𝑉</m:t>
+                              </m:r>
+                              <m:d>
+                                <m:dPr>
+                                  <m:ctrlPr>
+                                    <a:rPr lang="hr-HR" sz="2400" b="0" i="1" smtClean="0">
+                                      <a:latin typeface="Cambria Math" panose="02040503050406030204" pitchFamily="18" charset="0"/>
+                                      <a:ea typeface="Cambria Math" panose="02040503050406030204" pitchFamily="18" charset="0"/>
+                                    </a:rPr>
+                                  </m:ctrlPr>
+                                </m:dPr>
+                                <m:e>
+                                  <m:r>
+                                    <a:rPr lang="hr-HR" sz="2400" b="0" i="1" smtClean="0">
+                                      <a:latin typeface="Cambria Math" panose="02040503050406030204" pitchFamily="18" charset="0"/>
+                                      <a:ea typeface="Cambria Math" panose="02040503050406030204" pitchFamily="18" charset="0"/>
+                                    </a:rPr>
+                                    <m:t>𝑋</m:t>
+                                  </m:r>
+                                </m:e>
+                              </m:d>
+                              <m:r>
+                                <a:rPr lang="hr-HR" sz="2400" b="0" i="1" smtClean="0">
+                                  <a:latin typeface="Cambria Math" panose="02040503050406030204" pitchFamily="18" charset="0"/>
+                                  <a:ea typeface="Cambria Math" panose="02040503050406030204" pitchFamily="18" charset="0"/>
+                                </a:rPr>
+                                <m:t>+</m:t>
+                              </m:r>
+                              <m:r>
+                                <a:rPr lang="hr-HR" sz="2400" b="0" i="1" smtClean="0">
+                                  <a:latin typeface="Cambria Math" panose="02040503050406030204" pitchFamily="18" charset="0"/>
+                                  <a:ea typeface="Cambria Math" panose="02040503050406030204" pitchFamily="18" charset="0"/>
+                                </a:rPr>
+                                <m:t>𝜀</m:t>
+                              </m:r>
+                            </m:e>
+                          </m:rad>
+                        </m:den>
+                      </m:f>
+                      <m:r>
+                        <a:rPr lang="hr-HR" sz="2400" i="1">
+                          <a:latin typeface="Cambria Math" panose="02040503050406030204" pitchFamily="18" charset="0"/>
+                          <a:ea typeface="Cambria Math" panose="02040503050406030204" pitchFamily="18" charset="0"/>
+                        </a:rPr>
+                        <m:t>𝛾</m:t>
+                      </m:r>
+                      <m:r>
+                        <a:rPr lang="hr-HR" sz="2400" b="0" i="1" smtClean="0">
+                          <a:latin typeface="Cambria Math" panose="02040503050406030204" pitchFamily="18" charset="0"/>
+                          <a:ea typeface="Cambria Math" panose="02040503050406030204" pitchFamily="18" charset="0"/>
+                        </a:rPr>
+                        <m:t>+</m:t>
+                      </m:r>
+                      <m:r>
+                        <a:rPr lang="hr-HR" sz="2400" i="1">
+                          <a:latin typeface="Cambria Math" panose="02040503050406030204" pitchFamily="18" charset="0"/>
+                          <a:ea typeface="Cambria Math" panose="02040503050406030204" pitchFamily="18" charset="0"/>
+                        </a:rPr>
+                        <m:t>𝛽</m:t>
+                      </m:r>
+                    </m:oMath>
+                  </m:oMathPara>
+                </a14:m>
+                <a:endParaRPr lang="en-HR" sz="2400" dirty="0"/>
+              </a:p>
+            </p:txBody>
+          </p:sp>
+        </mc:Choice>
+        <mc:Fallback>
+          <p:sp>
+            <p:nvSpPr>
+              <p:cNvPr id="4" name="TextBox 3">
+                <a:extLst>
+                  <a:ext uri="{FF2B5EF4-FFF2-40B4-BE49-F238E27FC236}">
+                    <a16:creationId xmlns:a16="http://schemas.microsoft.com/office/drawing/2014/main" id="{B2EA1116-2CBB-A024-904D-4BC872E63493}"/>
+                  </a:ext>
+                </a:extLst>
+              </p:cNvPr>
+              <p:cNvSpPr txBox="1">
+                <a:spLocks noRot="1" noChangeAspect="1" noMove="1" noResize="1" noEditPoints="1" noAdjustHandles="1" noChangeArrowheads="1" noChangeShapeType="1" noTextEdit="1"/>
+              </p:cNvSpPr>
+              <p:nvPr/>
+            </p:nvSpPr>
+            <p:spPr>
+              <a:xfrm>
+                <a:off x="2771800" y="4869160"/>
+                <a:ext cx="2592288" cy="938783"/>
+              </a:xfrm>
+              <a:prstGeom prst="rect">
+                <a:avLst/>
+              </a:prstGeom>
+              <a:blipFill>
+                <a:blip r:embed="rId3"/>
+                <a:stretch>
+                  <a:fillRect/>
+                </a:stretch>
+              </a:blipFill>
+            </p:spPr>
+            <p:txBody>
+              <a:bodyPr/>
+              <a:lstStyle/>
+              <a:p>
+                <a:r>
+                  <a:rPr lang="en-HR">
+                    <a:noFill/>
+                  </a:rPr>
+                  <a:t> </a:t>
+                </a:r>
+              </a:p>
+            </p:txBody>
+          </p:sp>
+        </mc:Fallback>
+      </mc:AlternateContent>
     </p:spTree>
     <p:extLst>
       <p:ext uri="{BB962C8B-B14F-4D97-AF65-F5344CB8AC3E}">

</xml_diff>